<commit_message>
- week 2 lecture slide updates - added starter notebook
</commit_message>
<xml_diff>
--- a/lectures/week2/lecture2/slides/week2_lecture2.pptx
+++ b/lectures/week2/lecture2/slides/week2_lecture2.pptx
@@ -15836,10 +15836,10 @@
       </p:sp>
       <p:sp>
         <p:nvSpPr>
-          <p:cNvPr id="2" name="TextBox 1">
-            <a:extLst>
-              <a:ext uri="{FF2B5EF4-FFF2-40B4-BE49-F238E27FC236}">
-                <a16:creationId xmlns:a16="http://schemas.microsoft.com/office/drawing/2014/main" id="{E5A98B5B-3D09-4325-B921-561B2C3D18B1}"/>
+          <p:cNvPr id="3" name="TextBox 2">
+            <a:extLst>
+              <a:ext uri="{FF2B5EF4-FFF2-40B4-BE49-F238E27FC236}">
+                <a16:creationId xmlns:a16="http://schemas.microsoft.com/office/drawing/2014/main" id="{C0A80A8C-FB4A-407E-2831-ACAFCDCE0030}"/>
               </a:ext>
             </a:extLst>
           </p:cNvPr>
@@ -15848,8 +15848,8 @@
         </p:nvSpPr>
         <p:spPr>
           <a:xfrm>
-            <a:off x="9354071" y="1029719"/>
-            <a:ext cx="2265364" cy="707886"/>
+            <a:off x="8660253" y="902294"/>
+            <a:ext cx="2988319" cy="923330"/>
           </a:xfrm>
           <a:prstGeom prst="rect">
             <a:avLst/>
@@ -15863,7 +15863,7 @@
           <a:lstStyle/>
           <a:p>
             <a:r>
-              <a:rPr lang="en-US" sz="4000" b="1" dirty="0">
+              <a:rPr lang="en-US" sz="5400" b="1" dirty="0">
                 <a:solidFill>
                   <a:schemeClr val="accent6"/>
                 </a:solidFill>
@@ -15871,9 +15871,9 @@
               <a:t>Practice</a:t>
             </a:r>
             <a:r>
-              <a:rPr lang="en-US" sz="4000" b="1" dirty="0">
-                <a:solidFill>
-                  <a:schemeClr val="accent1"/>
+              <a:rPr lang="en-US" sz="5400" b="1" dirty="0">
+                <a:solidFill>
+                  <a:srgbClr val="FFFFFF"/>
                 </a:solidFill>
               </a:rPr>
               <a:t>!</a:t>

</xml_diff>

<commit_message>
- week2_lecture2 notebook and slide update
</commit_message>
<xml_diff>
--- a/lectures/week2/lecture2/slides/week2_lecture2.pptx
+++ b/lectures/week2/lecture2/slides/week2_lecture2.pptx
@@ -19746,7 +19746,27 @@
                 <a:latin typeface="Courier New" panose="02070309020205020404" pitchFamily="49" charset="0"/>
                 <a:cs typeface="Courier New" panose="02070309020205020404" pitchFamily="49" charset="0"/>
               </a:rPr>
-              <a:t>def function_body(parameters):</a:t>
+              <a:t>def </a:t>
+            </a:r>
+            <a:r>
+              <a:rPr lang="en-US" sz="2400" b="1">
+                <a:solidFill>
+                  <a:srgbClr val="00FF00"/>
+                </a:solidFill>
+                <a:latin typeface="Courier New" panose="02070309020205020404" pitchFamily="49" charset="0"/>
+                <a:cs typeface="Courier New" panose="02070309020205020404" pitchFamily="49" charset="0"/>
+              </a:rPr>
+              <a:t>function_name(</a:t>
+            </a:r>
+            <a:r>
+              <a:rPr lang="en-US" sz="2400" b="1" dirty="0">
+                <a:solidFill>
+                  <a:srgbClr val="00FF00"/>
+                </a:solidFill>
+                <a:latin typeface="Courier New" panose="02070309020205020404" pitchFamily="49" charset="0"/>
+                <a:cs typeface="Courier New" panose="02070309020205020404" pitchFamily="49" charset="0"/>
+              </a:rPr>
+              <a:t>parameters):</a:t>
             </a:r>
           </a:p>
           <a:p>

</xml_diff>

<commit_message>
- week2_lecture2 interactive notebook
</commit_message>
<xml_diff>
--- a/lectures/week2/lecture2/slides/week2_lecture2.pptx
+++ b/lectures/week2/lecture2/slides/week2_lecture2.pptx
@@ -19352,7 +19352,15 @@
           <a:p>
             <a:r>
               <a:rPr lang="en-US" dirty="0"/>
-              <a:t>The difference between print and return is point of confusion year after year.</a:t>
+              <a:t>The difference between print and return is point of confusion year after year</a:t>
+            </a:r>
+            <a:r>
+              <a:rPr lang="en-US" dirty="0">
+                <a:solidFill>
+                  <a:schemeClr val="accent1"/>
+                </a:solidFill>
+              </a:rPr>
+              <a:t>.</a:t>
             </a:r>
           </a:p>
           <a:p>
@@ -19746,27 +19754,7 @@
                 <a:latin typeface="Courier New" panose="02070309020205020404" pitchFamily="49" charset="0"/>
                 <a:cs typeface="Courier New" panose="02070309020205020404" pitchFamily="49" charset="0"/>
               </a:rPr>
-              <a:t>def </a:t>
-            </a:r>
-            <a:r>
-              <a:rPr lang="en-US" sz="2400" b="1">
-                <a:solidFill>
-                  <a:srgbClr val="00FF00"/>
-                </a:solidFill>
-                <a:latin typeface="Courier New" panose="02070309020205020404" pitchFamily="49" charset="0"/>
-                <a:cs typeface="Courier New" panose="02070309020205020404" pitchFamily="49" charset="0"/>
-              </a:rPr>
-              <a:t>function_name(</a:t>
-            </a:r>
-            <a:r>
-              <a:rPr lang="en-US" sz="2400" b="1" dirty="0">
-                <a:solidFill>
-                  <a:srgbClr val="00FF00"/>
-                </a:solidFill>
-                <a:latin typeface="Courier New" panose="02070309020205020404" pitchFamily="49" charset="0"/>
-                <a:cs typeface="Courier New" panose="02070309020205020404" pitchFamily="49" charset="0"/>
-              </a:rPr>
-              <a:t>parameters):</a:t>
+              <a:t>def function_name(parameters):</a:t>
             </a:r>
           </a:p>
           <a:p>

</xml_diff>